<commit_message>
Different overlays-related and zone detection tests performed.
</commit_message>
<xml_diff>
--- a/TestVI's/Overlays_test.pptx
+++ b/TestVI's/Overlays_test.pptx
@@ -7,6 +7,7 @@
   <p:sldIdLst>
     <p:sldId id="256" r:id="rId2"/>
     <p:sldId id="257" r:id="rId3"/>
+    <p:sldId id="258" r:id="rId4"/>
   </p:sldIdLst>
   <p:sldSz cx="9144000" cy="6858000" type="screen4x3"/>
   <p:notesSz cx="6858000" cy="9144000"/>
@@ -105,6 +106,11 @@
       </a:defRPr>
     </a:lvl9pPr>
   </p:defaultTextStyle>
+  <p:extLst>
+    <p:ext uri="{EFAFB233-063F-42B5-8137-9DF3F51BA10A}">
+      <p15:sldGuideLst xmlns:p15="http://schemas.microsoft.com/office/powerpoint/2012/main"/>
+    </p:ext>
+  </p:extLst>
 </p:presentation>
 </file>
 
@@ -3155,6 +3161,426 @@
 </p:sld>
 </file>
 
+<file path=ppt/slides/slide3.xml><?xml version="1.0" encoding="utf-8"?>
+<p:sld xmlns:a="http://schemas.openxmlformats.org/drawingml/2006/main" xmlns:r="http://schemas.openxmlformats.org/officeDocument/2006/relationships" xmlns:p="http://schemas.openxmlformats.org/presentationml/2006/main">
+  <p:cSld>
+    <p:spTree>
+      <p:nvGrpSpPr>
+        <p:cNvPr id="1" name=""/>
+        <p:cNvGrpSpPr/>
+        <p:nvPr/>
+      </p:nvGrpSpPr>
+      <p:grpSpPr>
+        <a:xfrm>
+          <a:off x="0" y="0"/>
+          <a:ext cx="0" cy="0"/>
+          <a:chOff x="0" y="0"/>
+          <a:chExt cx="0" cy="0"/>
+        </a:xfrm>
+      </p:grpSpPr>
+      <p:grpSp>
+        <p:nvGrpSpPr>
+          <p:cNvPr id="10" name="Group 9"/>
+          <p:cNvGrpSpPr/>
+          <p:nvPr/>
+        </p:nvGrpSpPr>
+        <p:grpSpPr>
+          <a:xfrm>
+            <a:off x="2048435" y="142805"/>
+            <a:ext cx="5047131" cy="6572391"/>
+            <a:chOff x="2737222" y="1062118"/>
+            <a:chExt cx="4285133" cy="5580115"/>
+          </a:xfrm>
+        </p:grpSpPr>
+        <p:sp>
+          <p:nvSpPr>
+            <p:cNvPr id="8" name="Teardrop 7"/>
+            <p:cNvSpPr/>
+            <p:nvPr/>
+          </p:nvSpPr>
+          <p:spPr>
+            <a:xfrm rot="18900000">
+              <a:off x="4184142" y="5250945"/>
+              <a:ext cx="1391288" cy="1391288"/>
+            </a:xfrm>
+            <a:prstGeom prst="teardrop">
+              <a:avLst/>
+            </a:prstGeom>
+            <a:solidFill>
+              <a:srgbClr val="71DAFF"/>
+            </a:solidFill>
+            <a:ln w="28575">
+              <a:solidFill>
+                <a:srgbClr val="5F5F5F"/>
+              </a:solidFill>
+            </a:ln>
+          </p:spPr>
+          <p:style>
+            <a:lnRef idx="2">
+              <a:schemeClr val="accent1">
+                <a:shade val="50000"/>
+              </a:schemeClr>
+            </a:lnRef>
+            <a:fillRef idx="1">
+              <a:schemeClr val="accent1"/>
+            </a:fillRef>
+            <a:effectRef idx="0">
+              <a:schemeClr val="accent1"/>
+            </a:effectRef>
+            <a:fontRef idx="minor">
+              <a:schemeClr val="lt1"/>
+            </a:fontRef>
+          </p:style>
+          <p:txBody>
+            <a:bodyPr rtlCol="0" anchor="ctr"/>
+            <a:lstStyle/>
+            <a:p>
+              <a:pPr algn="ctr"/>
+              <a:endParaRPr lang="en-US"/>
+            </a:p>
+          </p:txBody>
+        </p:sp>
+        <p:sp>
+          <p:nvSpPr>
+            <p:cNvPr id="2" name="Pie 1"/>
+            <p:cNvSpPr/>
+            <p:nvPr/>
+          </p:nvSpPr>
+          <p:spPr>
+            <a:xfrm>
+              <a:off x="2737224" y="1661459"/>
+              <a:ext cx="4285130" cy="4285130"/>
+            </a:xfrm>
+            <a:prstGeom prst="pie">
+              <a:avLst>
+                <a:gd name="adj1" fmla="val 21417466"/>
+                <a:gd name="adj2" fmla="val 4688028"/>
+              </a:avLst>
+            </a:prstGeom>
+            <a:solidFill>
+              <a:schemeClr val="accent4">
+                <a:lumMod val="60000"/>
+                <a:lumOff val="40000"/>
+              </a:schemeClr>
+            </a:solidFill>
+            <a:ln w="28575">
+              <a:solidFill>
+                <a:srgbClr val="5F5F5F"/>
+              </a:solidFill>
+            </a:ln>
+          </p:spPr>
+          <p:style>
+            <a:lnRef idx="2">
+              <a:schemeClr val="accent1">
+                <a:shade val="50000"/>
+              </a:schemeClr>
+            </a:lnRef>
+            <a:fillRef idx="1">
+              <a:schemeClr val="accent1"/>
+            </a:fillRef>
+            <a:effectRef idx="0">
+              <a:schemeClr val="accent1"/>
+            </a:effectRef>
+            <a:fontRef idx="minor">
+              <a:schemeClr val="lt1"/>
+            </a:fontRef>
+          </p:style>
+          <p:txBody>
+            <a:bodyPr rtlCol="0" anchor="ctr"/>
+            <a:lstStyle/>
+            <a:p>
+              <a:pPr algn="ctr"/>
+              <a:endParaRPr lang="en-US">
+                <a:solidFill>
+                  <a:schemeClr val="tx1"/>
+                </a:solidFill>
+              </a:endParaRPr>
+            </a:p>
+          </p:txBody>
+        </p:sp>
+        <p:sp>
+          <p:nvSpPr>
+            <p:cNvPr id="5" name="Pie 4"/>
+            <p:cNvSpPr/>
+            <p:nvPr/>
+          </p:nvSpPr>
+          <p:spPr>
+            <a:xfrm rot="13500000">
+              <a:off x="2737224" y="1661459"/>
+              <a:ext cx="4285130" cy="4285130"/>
+            </a:xfrm>
+            <a:prstGeom prst="pie">
+              <a:avLst>
+                <a:gd name="adj1" fmla="val 0"/>
+                <a:gd name="adj2" fmla="val 7921568"/>
+              </a:avLst>
+            </a:prstGeom>
+            <a:solidFill>
+              <a:srgbClr val="00B050"/>
+            </a:solidFill>
+            <a:ln w="28575">
+              <a:solidFill>
+                <a:srgbClr val="5F5F5F"/>
+              </a:solidFill>
+            </a:ln>
+          </p:spPr>
+          <p:style>
+            <a:lnRef idx="2">
+              <a:schemeClr val="accent1">
+                <a:shade val="50000"/>
+              </a:schemeClr>
+            </a:lnRef>
+            <a:fillRef idx="1">
+              <a:schemeClr val="accent1"/>
+            </a:fillRef>
+            <a:effectRef idx="0">
+              <a:schemeClr val="accent1"/>
+            </a:effectRef>
+            <a:fontRef idx="minor">
+              <a:schemeClr val="lt1"/>
+            </a:fontRef>
+          </p:style>
+          <p:txBody>
+            <a:bodyPr rtlCol="0" anchor="ctr"/>
+            <a:lstStyle/>
+            <a:p>
+              <a:pPr algn="ctr"/>
+              <a:endParaRPr lang="en-US">
+                <a:solidFill>
+                  <a:schemeClr val="tx1"/>
+                </a:solidFill>
+              </a:endParaRPr>
+            </a:p>
+          </p:txBody>
+        </p:sp>
+        <p:sp>
+          <p:nvSpPr>
+            <p:cNvPr id="3" name="Teardrop 2"/>
+            <p:cNvSpPr/>
+            <p:nvPr/>
+          </p:nvSpPr>
+          <p:spPr>
+            <a:xfrm rot="8100000">
+              <a:off x="4184144" y="1062118"/>
+              <a:ext cx="1391288" cy="1391288"/>
+            </a:xfrm>
+            <a:prstGeom prst="teardrop">
+              <a:avLst/>
+            </a:prstGeom>
+            <a:solidFill>
+              <a:schemeClr val="accent2">
+                <a:lumMod val="60000"/>
+                <a:lumOff val="40000"/>
+              </a:schemeClr>
+            </a:solidFill>
+            <a:ln w="28575">
+              <a:solidFill>
+                <a:srgbClr val="5F5F5F"/>
+              </a:solidFill>
+            </a:ln>
+          </p:spPr>
+          <p:style>
+            <a:lnRef idx="2">
+              <a:schemeClr val="accent1">
+                <a:shade val="50000"/>
+              </a:schemeClr>
+            </a:lnRef>
+            <a:fillRef idx="1">
+              <a:schemeClr val="accent1"/>
+            </a:fillRef>
+            <a:effectRef idx="0">
+              <a:schemeClr val="accent1"/>
+            </a:effectRef>
+            <a:fontRef idx="minor">
+              <a:schemeClr val="lt1"/>
+            </a:fontRef>
+          </p:style>
+          <p:txBody>
+            <a:bodyPr rtlCol="0" anchor="ctr"/>
+            <a:lstStyle/>
+            <a:p>
+              <a:pPr algn="ctr"/>
+              <a:endParaRPr lang="en-US"/>
+            </a:p>
+          </p:txBody>
+        </p:sp>
+        <p:sp>
+          <p:nvSpPr>
+            <p:cNvPr id="6" name="Pie 5"/>
+            <p:cNvSpPr/>
+            <p:nvPr/>
+          </p:nvSpPr>
+          <p:spPr>
+            <a:xfrm rot="13500000">
+              <a:off x="2737225" y="1661458"/>
+              <a:ext cx="4285130" cy="4285130"/>
+            </a:xfrm>
+            <a:prstGeom prst="pie">
+              <a:avLst>
+                <a:gd name="adj1" fmla="val 18293055"/>
+                <a:gd name="adj2" fmla="val 6906"/>
+              </a:avLst>
+            </a:prstGeom>
+            <a:solidFill>
+              <a:schemeClr val="accent2"/>
+            </a:solidFill>
+            <a:ln w="28575">
+              <a:solidFill>
+                <a:srgbClr val="5F5F5F"/>
+              </a:solidFill>
+            </a:ln>
+          </p:spPr>
+          <p:style>
+            <a:lnRef idx="2">
+              <a:schemeClr val="accent1">
+                <a:shade val="50000"/>
+              </a:schemeClr>
+            </a:lnRef>
+            <a:fillRef idx="1">
+              <a:schemeClr val="accent1"/>
+            </a:fillRef>
+            <a:effectRef idx="0">
+              <a:schemeClr val="accent1"/>
+            </a:effectRef>
+            <a:fontRef idx="minor">
+              <a:schemeClr val="lt1"/>
+            </a:fontRef>
+          </p:style>
+          <p:txBody>
+            <a:bodyPr rtlCol="0" anchor="ctr"/>
+            <a:lstStyle/>
+            <a:p>
+              <a:pPr algn="ctr"/>
+              <a:endParaRPr lang="en-US">
+                <a:solidFill>
+                  <a:schemeClr val="tx1"/>
+                </a:solidFill>
+              </a:endParaRPr>
+            </a:p>
+          </p:txBody>
+        </p:sp>
+        <p:sp>
+          <p:nvSpPr>
+            <p:cNvPr id="7" name="Pie 6"/>
+            <p:cNvSpPr/>
+            <p:nvPr/>
+          </p:nvSpPr>
+          <p:spPr>
+            <a:xfrm rot="13500000">
+              <a:off x="2737222" y="1661456"/>
+              <a:ext cx="4285130" cy="4285130"/>
+            </a:xfrm>
+            <a:prstGeom prst="pie">
+              <a:avLst>
+                <a:gd name="adj1" fmla="val 12780876"/>
+                <a:gd name="adj2" fmla="val 18297121"/>
+              </a:avLst>
+            </a:prstGeom>
+            <a:ln w="28575">
+              <a:solidFill>
+                <a:srgbClr val="5F5F5F"/>
+              </a:solidFill>
+            </a:ln>
+          </p:spPr>
+          <p:style>
+            <a:lnRef idx="2">
+              <a:schemeClr val="accent1">
+                <a:shade val="50000"/>
+              </a:schemeClr>
+            </a:lnRef>
+            <a:fillRef idx="1">
+              <a:schemeClr val="accent1"/>
+            </a:fillRef>
+            <a:effectRef idx="0">
+              <a:schemeClr val="accent1"/>
+            </a:effectRef>
+            <a:fontRef idx="minor">
+              <a:schemeClr val="lt1"/>
+            </a:fontRef>
+          </p:style>
+          <p:txBody>
+            <a:bodyPr rtlCol="0" anchor="ctr"/>
+            <a:lstStyle/>
+            <a:p>
+              <a:pPr algn="ctr"/>
+              <a:endParaRPr lang="en-US">
+                <a:solidFill>
+                  <a:schemeClr val="tx1"/>
+                </a:solidFill>
+              </a:endParaRPr>
+            </a:p>
+          </p:txBody>
+        </p:sp>
+        <p:sp>
+          <p:nvSpPr>
+            <p:cNvPr id="9" name="Block Arc 8"/>
+            <p:cNvSpPr/>
+            <p:nvPr/>
+          </p:nvSpPr>
+          <p:spPr>
+            <a:xfrm rot="14343770">
+              <a:off x="3842537" y="2791991"/>
+              <a:ext cx="2074498" cy="2074498"/>
+            </a:xfrm>
+            <a:prstGeom prst="blockArc">
+              <a:avLst>
+                <a:gd name="adj1" fmla="val 8768174"/>
+                <a:gd name="adj2" fmla="val 0"/>
+                <a:gd name="adj3" fmla="val 25000"/>
+              </a:avLst>
+            </a:prstGeom>
+            <a:solidFill>
+              <a:srgbClr val="FFFF00"/>
+            </a:solidFill>
+            <a:ln w="28575">
+              <a:solidFill>
+                <a:srgbClr val="5F5F5F"/>
+              </a:solidFill>
+            </a:ln>
+          </p:spPr>
+          <p:style>
+            <a:lnRef idx="2">
+              <a:schemeClr val="accent1">
+                <a:shade val="50000"/>
+              </a:schemeClr>
+            </a:lnRef>
+            <a:fillRef idx="1">
+              <a:schemeClr val="accent1"/>
+            </a:fillRef>
+            <a:effectRef idx="0">
+              <a:schemeClr val="accent1"/>
+            </a:effectRef>
+            <a:fontRef idx="minor">
+              <a:schemeClr val="lt1"/>
+            </a:fontRef>
+          </p:style>
+          <p:txBody>
+            <a:bodyPr rtlCol="0" anchor="ctr"/>
+            <a:lstStyle/>
+            <a:p>
+              <a:pPr algn="ctr"/>
+              <a:endParaRPr lang="en-US">
+                <a:solidFill>
+                  <a:schemeClr val="tx1"/>
+                </a:solidFill>
+              </a:endParaRPr>
+            </a:p>
+          </p:txBody>
+        </p:sp>
+      </p:grpSp>
+    </p:spTree>
+    <p:extLst>
+      <p:ext uri="{BB962C8B-B14F-4D97-AF65-F5344CB8AC3E}">
+        <p14:creationId xmlns:p14="http://schemas.microsoft.com/office/powerpoint/2010/main" val="1265674839"/>
+      </p:ext>
+    </p:extLst>
+  </p:cSld>
+  <p:clrMapOvr>
+    <a:masterClrMapping/>
+  </p:clrMapOvr>
+</p:sld>
+</file>
+
 <file path=ppt/theme/theme1.xml><?xml version="1.0" encoding="utf-8"?>
 <a:theme xmlns:a="http://schemas.openxmlformats.org/drawingml/2006/main" name="Office Theme">
   <a:themeElements>

</xml_diff>